<commit_message>
New CargoSpace for hill climbing algorithm
</commit_message>
<xml_diff>
--- a/Genetic Algorithm Autom Pack/Diagrams.pptx
+++ b/Genetic Algorithm Autom Pack/Diagrams.pptx
@@ -6,6 +6,7 @@
   </p:sldMasterIdLst>
   <p:sldIdLst>
     <p:sldId id="256" r:id="rId2"/>
+    <p:sldId id="257" r:id="rId3"/>
   </p:sldIdLst>
   <p:sldSz cx="12192000" cy="6858000"/>
   <p:notesSz cx="6858000" cy="9144000"/>
@@ -104,6 +105,11 @@
       </a:defRPr>
     </a:lvl9pPr>
   </p:defaultTextStyle>
+  <p:extLst>
+    <p:ext uri="{EFAFB233-063F-42B5-8137-9DF3F51BA10A}">
+      <p15:sldGuideLst xmlns:p15="http://schemas.microsoft.com/office/powerpoint/2012/main"/>
+    </p:ext>
+  </p:extLst>
 </p:presentation>
 </file>
 
@@ -238,7 +244,7 @@
           <a:p>
             <a:fld id="{D060CFD4-460E-499E-AAE4-F835448407CD}" type="datetimeFigureOut">
               <a:rPr lang="en-GB" smtClean="0"/>
-              <a:t>16/01/2016</a:t>
+              <a:t>18/01/2016</a:t>
             </a:fld>
             <a:endParaRPr lang="en-GB"/>
           </a:p>
@@ -408,7 +414,7 @@
           <a:p>
             <a:fld id="{D060CFD4-460E-499E-AAE4-F835448407CD}" type="datetimeFigureOut">
               <a:rPr lang="en-GB" smtClean="0"/>
-              <a:t>16/01/2016</a:t>
+              <a:t>18/01/2016</a:t>
             </a:fld>
             <a:endParaRPr lang="en-GB"/>
           </a:p>
@@ -588,7 +594,7 @@
           <a:p>
             <a:fld id="{D060CFD4-460E-499E-AAE4-F835448407CD}" type="datetimeFigureOut">
               <a:rPr lang="en-GB" smtClean="0"/>
-              <a:t>16/01/2016</a:t>
+              <a:t>18/01/2016</a:t>
             </a:fld>
             <a:endParaRPr lang="en-GB"/>
           </a:p>
@@ -758,7 +764,7 @@
           <a:p>
             <a:fld id="{D060CFD4-460E-499E-AAE4-F835448407CD}" type="datetimeFigureOut">
               <a:rPr lang="en-GB" smtClean="0"/>
-              <a:t>16/01/2016</a:t>
+              <a:t>18/01/2016</a:t>
             </a:fld>
             <a:endParaRPr lang="en-GB"/>
           </a:p>
@@ -1004,7 +1010,7 @@
           <a:p>
             <a:fld id="{D060CFD4-460E-499E-AAE4-F835448407CD}" type="datetimeFigureOut">
               <a:rPr lang="en-GB" smtClean="0"/>
-              <a:t>16/01/2016</a:t>
+              <a:t>18/01/2016</a:t>
             </a:fld>
             <a:endParaRPr lang="en-GB"/>
           </a:p>
@@ -1236,7 +1242,7 @@
           <a:p>
             <a:fld id="{D060CFD4-460E-499E-AAE4-F835448407CD}" type="datetimeFigureOut">
               <a:rPr lang="en-GB" smtClean="0"/>
-              <a:t>16/01/2016</a:t>
+              <a:t>18/01/2016</a:t>
             </a:fld>
             <a:endParaRPr lang="en-GB"/>
           </a:p>
@@ -1603,7 +1609,7 @@
           <a:p>
             <a:fld id="{D060CFD4-460E-499E-AAE4-F835448407CD}" type="datetimeFigureOut">
               <a:rPr lang="en-GB" smtClean="0"/>
-              <a:t>16/01/2016</a:t>
+              <a:t>18/01/2016</a:t>
             </a:fld>
             <a:endParaRPr lang="en-GB"/>
           </a:p>
@@ -1721,7 +1727,7 @@
           <a:p>
             <a:fld id="{D060CFD4-460E-499E-AAE4-F835448407CD}" type="datetimeFigureOut">
               <a:rPr lang="en-GB" smtClean="0"/>
-              <a:t>16/01/2016</a:t>
+              <a:t>18/01/2016</a:t>
             </a:fld>
             <a:endParaRPr lang="en-GB"/>
           </a:p>
@@ -1816,7 +1822,7 @@
           <a:p>
             <a:fld id="{D060CFD4-460E-499E-AAE4-F835448407CD}" type="datetimeFigureOut">
               <a:rPr lang="en-GB" smtClean="0"/>
-              <a:t>16/01/2016</a:t>
+              <a:t>18/01/2016</a:t>
             </a:fld>
             <a:endParaRPr lang="en-GB"/>
           </a:p>
@@ -2093,7 +2099,7 @@
           <a:p>
             <a:fld id="{D060CFD4-460E-499E-AAE4-F835448407CD}" type="datetimeFigureOut">
               <a:rPr lang="en-GB" smtClean="0"/>
-              <a:t>16/01/2016</a:t>
+              <a:t>18/01/2016</a:t>
             </a:fld>
             <a:endParaRPr lang="en-GB"/>
           </a:p>
@@ -2346,7 +2352,7 @@
           <a:p>
             <a:fld id="{D060CFD4-460E-499E-AAE4-F835448407CD}" type="datetimeFigureOut">
               <a:rPr lang="en-GB" smtClean="0"/>
-              <a:t>16/01/2016</a:t>
+              <a:t>18/01/2016</a:t>
             </a:fld>
             <a:endParaRPr lang="en-GB"/>
           </a:p>
@@ -2559,7 +2565,7 @@
           <a:p>
             <a:fld id="{D060CFD4-460E-499E-AAE4-F835448407CD}" type="datetimeFigureOut">
               <a:rPr lang="en-GB" smtClean="0"/>
-              <a:t>16/01/2016</a:t>
+              <a:t>18/01/2016</a:t>
             </a:fld>
             <a:endParaRPr lang="en-GB"/>
           </a:p>
@@ -2972,7 +2978,7 @@
         </p:nvSpPr>
         <p:spPr>
           <a:xfrm>
-            <a:off x="1515762" y="1372638"/>
+            <a:off x="4312712" y="2892956"/>
             <a:ext cx="1440000" cy="900000"/>
           </a:xfrm>
           <a:prstGeom prst="rect">
@@ -3055,7 +3061,7 @@
         </p:nvSpPr>
         <p:spPr>
           <a:xfrm>
-            <a:off x="3464011" y="472638"/>
+            <a:off x="9651211" y="5440994"/>
             <a:ext cx="1440000" cy="900000"/>
           </a:xfrm>
           <a:prstGeom prst="rect">
@@ -3119,7 +3125,7 @@
         </p:nvSpPr>
         <p:spPr>
           <a:xfrm>
-            <a:off x="4184011" y="2272638"/>
+            <a:off x="4312712" y="4540994"/>
             <a:ext cx="1440000" cy="900000"/>
           </a:xfrm>
           <a:prstGeom prst="rect">
@@ -3176,7 +3182,7 @@
         </p:nvSpPr>
         <p:spPr>
           <a:xfrm>
-            <a:off x="4352887" y="3248822"/>
+            <a:off x="2391033" y="4540994"/>
             <a:ext cx="1440000" cy="900000"/>
           </a:xfrm>
           <a:prstGeom prst="rect">
@@ -3233,7 +3239,7 @@
         </p:nvSpPr>
         <p:spPr>
           <a:xfrm>
-            <a:off x="2651774" y="4148822"/>
+            <a:off x="6234391" y="4540994"/>
             <a:ext cx="1440000" cy="900000"/>
           </a:xfrm>
           <a:prstGeom prst="rect">
@@ -3309,7 +3315,7 @@
         </p:nvSpPr>
         <p:spPr>
           <a:xfrm>
-            <a:off x="5930433" y="2272638"/>
+            <a:off x="469354" y="4540994"/>
             <a:ext cx="1440000" cy="900000"/>
           </a:xfrm>
           <a:prstGeom prst="rect">
@@ -3366,7 +3372,7 @@
         </p:nvSpPr>
         <p:spPr>
           <a:xfrm>
-            <a:off x="5292001" y="4367124"/>
+            <a:off x="8178988" y="4540994"/>
             <a:ext cx="1440000" cy="900000"/>
           </a:xfrm>
           <a:prstGeom prst="rect">
@@ -3415,10 +3421,704 @@
           </a:p>
         </p:txBody>
       </p:sp>
+      <p:sp>
+        <p:nvSpPr>
+          <p:cNvPr id="13" name="Rechteck 12"/>
+          <p:cNvSpPr/>
+          <p:nvPr/>
+        </p:nvSpPr>
+        <p:spPr>
+          <a:xfrm>
+            <a:off x="8931211" y="1045748"/>
+            <a:ext cx="1440000" cy="900000"/>
+          </a:xfrm>
+          <a:prstGeom prst="rect">
+            <a:avLst/>
+          </a:prstGeom>
+          <a:solidFill>
+            <a:schemeClr val="bg1"/>
+          </a:solidFill>
+          <a:ln>
+            <a:solidFill>
+              <a:schemeClr val="tx1"/>
+            </a:solidFill>
+          </a:ln>
+        </p:spPr>
+        <p:style>
+          <a:lnRef idx="2">
+            <a:schemeClr val="accent1">
+              <a:shade val="50000"/>
+            </a:schemeClr>
+          </a:lnRef>
+          <a:fillRef idx="1">
+            <a:schemeClr val="accent1"/>
+          </a:fillRef>
+          <a:effectRef idx="0">
+            <a:schemeClr val="accent1"/>
+          </a:effectRef>
+          <a:fontRef idx="minor">
+            <a:schemeClr val="lt1"/>
+          </a:fontRef>
+        </p:style>
+        <p:txBody>
+          <a:bodyPr rtlCol="0" anchor="ctr"/>
+          <a:lstStyle/>
+          <a:p>
+            <a:pPr algn="ctr"/>
+            <a:r>
+              <a:rPr lang="en-GB" dirty="0" smtClean="0">
+                <a:solidFill>
+                  <a:schemeClr val="tx1"/>
+                </a:solidFill>
+                <a:latin typeface="Arial" panose="020B0604020202020204" pitchFamily="34" charset="0"/>
+                <a:cs typeface="Arial" panose="020B0604020202020204" pitchFamily="34" charset="0"/>
+              </a:rPr>
+              <a:t>Display</a:t>
+            </a:r>
+            <a:endParaRPr lang="en-GB" dirty="0">
+              <a:solidFill>
+                <a:schemeClr val="tx1"/>
+              </a:solidFill>
+              <a:latin typeface="Arial" panose="020B0604020202020204" pitchFamily="34" charset="0"/>
+              <a:cs typeface="Arial" panose="020B0604020202020204" pitchFamily="34" charset="0"/>
+            </a:endParaRPr>
+          </a:p>
+        </p:txBody>
+      </p:sp>
+      <p:cxnSp>
+        <p:nvCxnSpPr>
+          <p:cNvPr id="3" name="Gewinkelte Verbindung 2"/>
+          <p:cNvCxnSpPr>
+            <a:stCxn id="5" idx="2"/>
+            <a:endCxn id="12" idx="0"/>
+          </p:cNvCxnSpPr>
+          <p:nvPr/>
+        </p:nvCxnSpPr>
+        <p:spPr>
+          <a:xfrm rot="16200000" flipH="1">
+            <a:off x="6591831" y="2233837"/>
+            <a:ext cx="748038" cy="3866276"/>
+          </a:xfrm>
+          <a:prstGeom prst="bentConnector3">
+            <a:avLst/>
+          </a:prstGeom>
+          <a:ln w="12700">
+            <a:solidFill>
+              <a:schemeClr val="tx1"/>
+            </a:solidFill>
+            <a:prstDash val="dash"/>
+            <a:tailEnd type="arrow" w="lg" len="lg"/>
+          </a:ln>
+        </p:spPr>
+        <p:style>
+          <a:lnRef idx="1">
+            <a:schemeClr val="accent1"/>
+          </a:lnRef>
+          <a:fillRef idx="0">
+            <a:schemeClr val="accent1"/>
+          </a:fillRef>
+          <a:effectRef idx="0">
+            <a:schemeClr val="accent1"/>
+          </a:effectRef>
+          <a:fontRef idx="minor">
+            <a:schemeClr val="tx1"/>
+          </a:fontRef>
+        </p:style>
+      </p:cxnSp>
+      <p:cxnSp>
+        <p:nvCxnSpPr>
+          <p:cNvPr id="6" name="Gewinkelte Verbindung 5"/>
+          <p:cNvCxnSpPr>
+            <a:stCxn id="5" idx="2"/>
+            <a:endCxn id="11" idx="0"/>
+          </p:cNvCxnSpPr>
+          <p:nvPr/>
+        </p:nvCxnSpPr>
+        <p:spPr>
+          <a:xfrm rot="5400000">
+            <a:off x="2737014" y="2245296"/>
+            <a:ext cx="748038" cy="3843358"/>
+          </a:xfrm>
+          <a:prstGeom prst="bentConnector3">
+            <a:avLst/>
+          </a:prstGeom>
+          <a:ln w="12700">
+            <a:solidFill>
+              <a:schemeClr val="tx1"/>
+            </a:solidFill>
+            <a:prstDash val="dash"/>
+            <a:tailEnd type="arrow" w="lg" len="lg"/>
+          </a:ln>
+        </p:spPr>
+        <p:style>
+          <a:lnRef idx="1">
+            <a:schemeClr val="accent1"/>
+          </a:lnRef>
+          <a:fillRef idx="0">
+            <a:schemeClr val="accent1"/>
+          </a:fillRef>
+          <a:effectRef idx="0">
+            <a:schemeClr val="accent1"/>
+          </a:effectRef>
+          <a:fontRef idx="minor">
+            <a:schemeClr val="tx1"/>
+          </a:fontRef>
+        </p:style>
+      </p:cxnSp>
+      <p:cxnSp>
+        <p:nvCxnSpPr>
+          <p:cNvPr id="15" name="Gewinkelte Verbindung 14"/>
+          <p:cNvCxnSpPr>
+            <a:stCxn id="5" idx="2"/>
+            <a:endCxn id="9" idx="0"/>
+          </p:cNvCxnSpPr>
+          <p:nvPr/>
+        </p:nvCxnSpPr>
+        <p:spPr>
+          <a:xfrm rot="5400000">
+            <a:off x="3697854" y="3206136"/>
+            <a:ext cx="748038" cy="1921679"/>
+          </a:xfrm>
+          <a:prstGeom prst="bentConnector3">
+            <a:avLst/>
+          </a:prstGeom>
+          <a:ln w="12700">
+            <a:solidFill>
+              <a:schemeClr val="tx1"/>
+            </a:solidFill>
+            <a:prstDash val="dash"/>
+            <a:tailEnd type="arrow" w="lg" len="lg"/>
+          </a:ln>
+        </p:spPr>
+        <p:style>
+          <a:lnRef idx="1">
+            <a:schemeClr val="accent1"/>
+          </a:lnRef>
+          <a:fillRef idx="0">
+            <a:schemeClr val="accent1"/>
+          </a:fillRef>
+          <a:effectRef idx="0">
+            <a:schemeClr val="accent1"/>
+          </a:effectRef>
+          <a:fontRef idx="minor">
+            <a:schemeClr val="tx1"/>
+          </a:fontRef>
+        </p:style>
+      </p:cxnSp>
+      <p:cxnSp>
+        <p:nvCxnSpPr>
+          <p:cNvPr id="17" name="Gewinkelte Verbindung 16"/>
+          <p:cNvCxnSpPr>
+            <a:stCxn id="5" idx="2"/>
+            <a:endCxn id="10" idx="0"/>
+          </p:cNvCxnSpPr>
+          <p:nvPr/>
+        </p:nvCxnSpPr>
+        <p:spPr>
+          <a:xfrm rot="16200000" flipH="1">
+            <a:off x="5619532" y="3206135"/>
+            <a:ext cx="748038" cy="1921679"/>
+          </a:xfrm>
+          <a:prstGeom prst="bentConnector3">
+            <a:avLst/>
+          </a:prstGeom>
+          <a:ln w="12700">
+            <a:solidFill>
+              <a:schemeClr val="tx1"/>
+            </a:solidFill>
+            <a:prstDash val="dash"/>
+            <a:tailEnd type="arrow" w="lg" len="lg"/>
+          </a:ln>
+        </p:spPr>
+        <p:style>
+          <a:lnRef idx="1">
+            <a:schemeClr val="accent1"/>
+          </a:lnRef>
+          <a:fillRef idx="0">
+            <a:schemeClr val="accent1"/>
+          </a:fillRef>
+          <a:effectRef idx="0">
+            <a:schemeClr val="accent1"/>
+          </a:effectRef>
+          <a:fontRef idx="minor">
+            <a:schemeClr val="tx1"/>
+          </a:fontRef>
+        </p:style>
+      </p:cxnSp>
+      <p:cxnSp>
+        <p:nvCxnSpPr>
+          <p:cNvPr id="19" name="Gerade Verbindung mit Pfeil 18"/>
+          <p:cNvCxnSpPr>
+            <a:stCxn id="8" idx="1"/>
+            <a:endCxn id="9" idx="3"/>
+          </p:cNvCxnSpPr>
+          <p:nvPr/>
+        </p:nvCxnSpPr>
+        <p:spPr>
+          <a:xfrm flipH="1">
+            <a:off x="3831033" y="4990994"/>
+            <a:ext cx="481679" cy="0"/>
+          </a:xfrm>
+          <a:prstGeom prst="straightConnector1">
+            <a:avLst/>
+          </a:prstGeom>
+          <a:ln w="12700">
+            <a:solidFill>
+              <a:schemeClr val="tx1"/>
+            </a:solidFill>
+            <a:prstDash val="dash"/>
+            <a:tailEnd type="arrow" w="lg" len="lg"/>
+          </a:ln>
+        </p:spPr>
+        <p:style>
+          <a:lnRef idx="1">
+            <a:schemeClr val="accent1"/>
+          </a:lnRef>
+          <a:fillRef idx="0">
+            <a:schemeClr val="accent1"/>
+          </a:fillRef>
+          <a:effectRef idx="0">
+            <a:schemeClr val="accent1"/>
+          </a:effectRef>
+          <a:fontRef idx="minor">
+            <a:schemeClr val="tx1"/>
+          </a:fontRef>
+        </p:style>
+      </p:cxnSp>
+      <p:cxnSp>
+        <p:nvCxnSpPr>
+          <p:cNvPr id="21" name="Gerade Verbindung mit Pfeil 20"/>
+          <p:cNvCxnSpPr>
+            <a:stCxn id="8" idx="3"/>
+            <a:endCxn id="10" idx="1"/>
+          </p:cNvCxnSpPr>
+          <p:nvPr/>
+        </p:nvCxnSpPr>
+        <p:spPr>
+          <a:xfrm>
+            <a:off x="5752712" y="4990994"/>
+            <a:ext cx="481679" cy="0"/>
+          </a:xfrm>
+          <a:prstGeom prst="straightConnector1">
+            <a:avLst/>
+          </a:prstGeom>
+          <a:ln w="12700">
+            <a:solidFill>
+              <a:schemeClr val="tx1"/>
+            </a:solidFill>
+            <a:prstDash val="dash"/>
+            <a:tailEnd type="arrow" w="lg" len="lg"/>
+          </a:ln>
+        </p:spPr>
+        <p:style>
+          <a:lnRef idx="1">
+            <a:schemeClr val="accent1"/>
+          </a:lnRef>
+          <a:fillRef idx="0">
+            <a:schemeClr val="accent1"/>
+          </a:fillRef>
+          <a:effectRef idx="0">
+            <a:schemeClr val="accent1"/>
+          </a:effectRef>
+          <a:fontRef idx="minor">
+            <a:schemeClr val="tx1"/>
+          </a:fontRef>
+        </p:style>
+      </p:cxnSp>
+      <p:cxnSp>
+        <p:nvCxnSpPr>
+          <p:cNvPr id="22" name="Gerade Verbindung mit Pfeil 21"/>
+          <p:cNvCxnSpPr>
+            <a:stCxn id="5" idx="2"/>
+            <a:endCxn id="8" idx="0"/>
+          </p:cNvCxnSpPr>
+          <p:nvPr/>
+        </p:nvCxnSpPr>
+        <p:spPr>
+          <a:xfrm>
+            <a:off x="5032712" y="3792956"/>
+            <a:ext cx="0" cy="748038"/>
+          </a:xfrm>
+          <a:prstGeom prst="straightConnector1">
+            <a:avLst/>
+          </a:prstGeom>
+          <a:ln w="12700">
+            <a:solidFill>
+              <a:schemeClr val="tx1"/>
+            </a:solidFill>
+            <a:prstDash val="dash"/>
+            <a:tailEnd type="arrow" w="lg" len="lg"/>
+          </a:ln>
+        </p:spPr>
+        <p:style>
+          <a:lnRef idx="1">
+            <a:schemeClr val="accent1"/>
+          </a:lnRef>
+          <a:fillRef idx="0">
+            <a:schemeClr val="accent1"/>
+          </a:fillRef>
+          <a:effectRef idx="0">
+            <a:schemeClr val="accent1"/>
+          </a:effectRef>
+          <a:fontRef idx="minor">
+            <a:schemeClr val="tx1"/>
+          </a:fontRef>
+        </p:style>
+      </p:cxnSp>
     </p:spTree>
     <p:extLst>
       <p:ext uri="{BB962C8B-B14F-4D97-AF65-F5344CB8AC3E}">
         <p14:creationId xmlns:p14="http://schemas.microsoft.com/office/powerpoint/2010/main" val="2785773338"/>
+      </p:ext>
+    </p:extLst>
+  </p:cSld>
+  <p:clrMapOvr>
+    <a:masterClrMapping/>
+  </p:clrMapOvr>
+</p:sld>
+</file>
+
+<file path=ppt/slides/slide2.xml><?xml version="1.0" encoding="utf-8"?>
+<p:sld xmlns:a="http://schemas.openxmlformats.org/drawingml/2006/main" xmlns:r="http://schemas.openxmlformats.org/officeDocument/2006/relationships" xmlns:p="http://schemas.openxmlformats.org/presentationml/2006/main">
+  <p:cSld>
+    <p:spTree>
+      <p:nvGrpSpPr>
+        <p:cNvPr id="1" name=""/>
+        <p:cNvGrpSpPr/>
+        <p:nvPr/>
+      </p:nvGrpSpPr>
+      <p:grpSpPr>
+        <a:xfrm>
+          <a:off x="0" y="0"/>
+          <a:ext cx="0" cy="0"/>
+          <a:chOff x="0" y="0"/>
+          <a:chExt cx="0" cy="0"/>
+        </a:xfrm>
+      </p:grpSpPr>
+      <p:sp>
+        <p:nvSpPr>
+          <p:cNvPr id="2" name="Rechteck 1"/>
+          <p:cNvSpPr/>
+          <p:nvPr/>
+        </p:nvSpPr>
+        <p:spPr>
+          <a:xfrm>
+            <a:off x="825597" y="844270"/>
+            <a:ext cx="1440000" cy="900000"/>
+          </a:xfrm>
+          <a:prstGeom prst="rect">
+            <a:avLst/>
+          </a:prstGeom>
+          <a:solidFill>
+            <a:schemeClr val="bg1"/>
+          </a:solidFill>
+          <a:ln>
+            <a:solidFill>
+              <a:schemeClr val="tx1"/>
+            </a:solidFill>
+          </a:ln>
+        </p:spPr>
+        <p:style>
+          <a:lnRef idx="2">
+            <a:schemeClr val="accent1">
+              <a:shade val="50000"/>
+            </a:schemeClr>
+          </a:lnRef>
+          <a:fillRef idx="1">
+            <a:schemeClr val="accent1"/>
+          </a:fillRef>
+          <a:effectRef idx="0">
+            <a:schemeClr val="accent1"/>
+          </a:effectRef>
+          <a:fontRef idx="minor">
+            <a:schemeClr val="lt1"/>
+          </a:fontRef>
+        </p:style>
+        <p:txBody>
+          <a:bodyPr rtlCol="0" anchor="ctr"/>
+          <a:lstStyle/>
+          <a:p>
+            <a:pPr algn="ctr"/>
+            <a:r>
+              <a:rPr lang="en-GB" dirty="0" smtClean="0">
+                <a:solidFill>
+                  <a:schemeClr val="tx1"/>
+                </a:solidFill>
+                <a:latin typeface="Arial" panose="020B0604020202020204" pitchFamily="34" charset="0"/>
+                <a:cs typeface="Arial" panose="020B0604020202020204" pitchFamily="34" charset="0"/>
+              </a:rPr>
+              <a:t>Display2D</a:t>
+            </a:r>
+            <a:endParaRPr lang="en-GB" dirty="0">
+              <a:solidFill>
+                <a:schemeClr val="tx1"/>
+              </a:solidFill>
+              <a:latin typeface="Arial" panose="020B0604020202020204" pitchFamily="34" charset="0"/>
+              <a:cs typeface="Arial" panose="020B0604020202020204" pitchFamily="34" charset="0"/>
+            </a:endParaRPr>
+          </a:p>
+        </p:txBody>
+      </p:sp>
+      <p:sp>
+        <p:nvSpPr>
+          <p:cNvPr id="3" name="Rechteck 2"/>
+          <p:cNvSpPr/>
+          <p:nvPr/>
+        </p:nvSpPr>
+        <p:spPr>
+          <a:xfrm>
+            <a:off x="3969169" y="1136154"/>
+            <a:ext cx="1440000" cy="900000"/>
+          </a:xfrm>
+          <a:prstGeom prst="rect">
+            <a:avLst/>
+          </a:prstGeom>
+          <a:solidFill>
+            <a:schemeClr val="bg1"/>
+          </a:solidFill>
+          <a:ln>
+            <a:solidFill>
+              <a:schemeClr val="tx1"/>
+            </a:solidFill>
+          </a:ln>
+        </p:spPr>
+        <p:style>
+          <a:lnRef idx="2">
+            <a:schemeClr val="accent1">
+              <a:shade val="50000"/>
+            </a:schemeClr>
+          </a:lnRef>
+          <a:fillRef idx="1">
+            <a:schemeClr val="accent1"/>
+          </a:fillRef>
+          <a:effectRef idx="0">
+            <a:schemeClr val="accent1"/>
+          </a:effectRef>
+          <a:fontRef idx="minor">
+            <a:schemeClr val="lt1"/>
+          </a:fontRef>
+        </p:style>
+        <p:txBody>
+          <a:bodyPr rtlCol="0" anchor="ctr"/>
+          <a:lstStyle/>
+          <a:p>
+            <a:pPr algn="ctr"/>
+            <a:r>
+              <a:rPr lang="en-GB" dirty="0" smtClean="0">
+                <a:solidFill>
+                  <a:schemeClr val="tx1"/>
+                </a:solidFill>
+                <a:latin typeface="Arial" panose="020B0604020202020204" pitchFamily="34" charset="0"/>
+                <a:cs typeface="Arial" panose="020B0604020202020204" pitchFamily="34" charset="0"/>
+              </a:rPr>
+              <a:t>Display3D</a:t>
+            </a:r>
+            <a:endParaRPr lang="en-GB" dirty="0">
+              <a:solidFill>
+                <a:schemeClr val="tx1"/>
+              </a:solidFill>
+              <a:latin typeface="Arial" panose="020B0604020202020204" pitchFamily="34" charset="0"/>
+              <a:cs typeface="Arial" panose="020B0604020202020204" pitchFamily="34" charset="0"/>
+            </a:endParaRPr>
+          </a:p>
+        </p:txBody>
+      </p:sp>
+      <p:sp>
+        <p:nvSpPr>
+          <p:cNvPr id="4" name="Rechteck 3"/>
+          <p:cNvSpPr/>
+          <p:nvPr/>
+        </p:nvSpPr>
+        <p:spPr>
+          <a:xfrm>
+            <a:off x="6725284" y="1586154"/>
+            <a:ext cx="1440000" cy="900000"/>
+          </a:xfrm>
+          <a:prstGeom prst="rect">
+            <a:avLst/>
+          </a:prstGeom>
+          <a:solidFill>
+            <a:schemeClr val="bg1"/>
+          </a:solidFill>
+          <a:ln>
+            <a:solidFill>
+              <a:schemeClr val="tx1"/>
+            </a:solidFill>
+          </a:ln>
+        </p:spPr>
+        <p:style>
+          <a:lnRef idx="2">
+            <a:schemeClr val="accent1">
+              <a:shade val="50000"/>
+            </a:schemeClr>
+          </a:lnRef>
+          <a:fillRef idx="1">
+            <a:schemeClr val="accent1"/>
+          </a:fillRef>
+          <a:effectRef idx="0">
+            <a:schemeClr val="accent1"/>
+          </a:effectRef>
+          <a:fontRef idx="minor">
+            <a:schemeClr val="lt1"/>
+          </a:fontRef>
+        </p:style>
+        <p:txBody>
+          <a:bodyPr rtlCol="0" anchor="ctr"/>
+          <a:lstStyle/>
+          <a:p>
+            <a:pPr algn="ctr"/>
+            <a:r>
+              <a:rPr lang="en-GB" dirty="0" smtClean="0">
+                <a:solidFill>
+                  <a:schemeClr val="tx1"/>
+                </a:solidFill>
+                <a:latin typeface="Arial" panose="020B0604020202020204" pitchFamily="34" charset="0"/>
+                <a:cs typeface="Arial" panose="020B0604020202020204" pitchFamily="34" charset="0"/>
+              </a:rPr>
+              <a:t>Cube</a:t>
+            </a:r>
+            <a:endParaRPr lang="en-GB" dirty="0">
+              <a:solidFill>
+                <a:schemeClr val="tx1"/>
+              </a:solidFill>
+              <a:latin typeface="Arial" panose="020B0604020202020204" pitchFamily="34" charset="0"/>
+              <a:cs typeface="Arial" panose="020B0604020202020204" pitchFamily="34" charset="0"/>
+            </a:endParaRPr>
+          </a:p>
+        </p:txBody>
+      </p:sp>
+      <p:sp>
+        <p:nvSpPr>
+          <p:cNvPr id="6" name="Rechteck 5"/>
+          <p:cNvSpPr/>
+          <p:nvPr/>
+        </p:nvSpPr>
+        <p:spPr>
+          <a:xfrm>
+            <a:off x="2395420" y="3006282"/>
+            <a:ext cx="1440000" cy="900000"/>
+          </a:xfrm>
+          <a:prstGeom prst="rect">
+            <a:avLst/>
+          </a:prstGeom>
+          <a:solidFill>
+            <a:schemeClr val="bg1"/>
+          </a:solidFill>
+          <a:ln>
+            <a:solidFill>
+              <a:schemeClr val="tx1"/>
+            </a:solidFill>
+          </a:ln>
+        </p:spPr>
+        <p:style>
+          <a:lnRef idx="2">
+            <a:schemeClr val="accent1">
+              <a:shade val="50000"/>
+            </a:schemeClr>
+          </a:lnRef>
+          <a:fillRef idx="1">
+            <a:schemeClr val="accent1"/>
+          </a:fillRef>
+          <a:effectRef idx="0">
+            <a:schemeClr val="accent1"/>
+          </a:effectRef>
+          <a:fontRef idx="minor">
+            <a:schemeClr val="lt1"/>
+          </a:fontRef>
+        </p:style>
+        <p:txBody>
+          <a:bodyPr rtlCol="0" anchor="ctr"/>
+          <a:lstStyle/>
+          <a:p>
+            <a:pPr algn="ctr"/>
+            <a:r>
+              <a:rPr lang="en-GB" dirty="0" err="1" smtClean="0">
+                <a:solidFill>
+                  <a:schemeClr val="tx1"/>
+                </a:solidFill>
+                <a:latin typeface="Arial" panose="020B0604020202020204" pitchFamily="34" charset="0"/>
+                <a:cs typeface="Arial" panose="020B0604020202020204" pitchFamily="34" charset="0"/>
+              </a:rPr>
+              <a:t>MainFrame</a:t>
+            </a:r>
+            <a:endParaRPr lang="en-GB" dirty="0">
+              <a:solidFill>
+                <a:schemeClr val="tx1"/>
+              </a:solidFill>
+              <a:latin typeface="Arial" panose="020B0604020202020204" pitchFamily="34" charset="0"/>
+              <a:cs typeface="Arial" panose="020B0604020202020204" pitchFamily="34" charset="0"/>
+            </a:endParaRPr>
+          </a:p>
+        </p:txBody>
+      </p:sp>
+      <p:sp>
+        <p:nvSpPr>
+          <p:cNvPr id="7" name="Rechteck 6"/>
+          <p:cNvSpPr/>
+          <p:nvPr/>
+        </p:nvSpPr>
+        <p:spPr>
+          <a:xfrm>
+            <a:off x="5285284" y="4030269"/>
+            <a:ext cx="1440000" cy="900000"/>
+          </a:xfrm>
+          <a:prstGeom prst="rect">
+            <a:avLst/>
+          </a:prstGeom>
+          <a:solidFill>
+            <a:schemeClr val="bg1"/>
+          </a:solidFill>
+          <a:ln>
+            <a:solidFill>
+              <a:schemeClr val="tx1"/>
+            </a:solidFill>
+          </a:ln>
+        </p:spPr>
+        <p:style>
+          <a:lnRef idx="2">
+            <a:schemeClr val="accent1">
+              <a:shade val="50000"/>
+            </a:schemeClr>
+          </a:lnRef>
+          <a:fillRef idx="1">
+            <a:schemeClr val="accent1"/>
+          </a:fillRef>
+          <a:effectRef idx="0">
+            <a:schemeClr val="accent1"/>
+          </a:effectRef>
+          <a:fontRef idx="minor">
+            <a:schemeClr val="lt1"/>
+          </a:fontRef>
+        </p:style>
+        <p:txBody>
+          <a:bodyPr rtlCol="0" anchor="ctr"/>
+          <a:lstStyle/>
+          <a:p>
+            <a:pPr algn="ctr"/>
+            <a:r>
+              <a:rPr lang="en-GB" dirty="0" smtClean="0">
+                <a:solidFill>
+                  <a:schemeClr val="tx1"/>
+                </a:solidFill>
+                <a:latin typeface="Arial" panose="020B0604020202020204" pitchFamily="34" charset="0"/>
+                <a:cs typeface="Arial" panose="020B0604020202020204" pitchFamily="34" charset="0"/>
+              </a:rPr>
+              <a:t>Point3D</a:t>
+            </a:r>
+            <a:endParaRPr lang="en-GB" dirty="0">
+              <a:solidFill>
+                <a:schemeClr val="tx1"/>
+              </a:solidFill>
+              <a:latin typeface="Arial" panose="020B0604020202020204" pitchFamily="34" charset="0"/>
+              <a:cs typeface="Arial" panose="020B0604020202020204" pitchFamily="34" charset="0"/>
+            </a:endParaRPr>
+          </a:p>
+        </p:txBody>
+      </p:sp>
+    </p:spTree>
+    <p:extLst>
+      <p:ext uri="{BB962C8B-B14F-4D97-AF65-F5344CB8AC3E}">
+        <p14:creationId xmlns:p14="http://schemas.microsoft.com/office/powerpoint/2010/main" val="1346064591"/>
       </p:ext>
     </p:extLst>
   </p:cSld>

</xml_diff>